<commit_message>
Updating slides for lesson 7
</commit_message>
<xml_diff>
--- a/companion-website/public/files/7. Primacy of the Primary Sources.pptx
+++ b/companion-website/public/files/7. Primacy of the Primary Sources.pptx
@@ -18,10 +18,10 @@
     <p:sldId id="440" r:id="rId9"/>
     <p:sldId id="450" r:id="rId10"/>
     <p:sldId id="451" r:id="rId11"/>
-    <p:sldId id="439" r:id="rId12"/>
-    <p:sldId id="454" r:id="rId13"/>
-    <p:sldId id="453" r:id="rId14"/>
-    <p:sldId id="435" r:id="rId15"/>
+    <p:sldId id="459" r:id="rId12"/>
+    <p:sldId id="439" r:id="rId13"/>
+    <p:sldId id="454" r:id="rId14"/>
+    <p:sldId id="453" r:id="rId15"/>
     <p:sldId id="452" r:id="rId16"/>
     <p:sldId id="455" r:id="rId17"/>
   </p:sldIdLst>
@@ -156,12 +156,12 @@
   </mc:AlternateContent>
   <c:clrMapOvr bg1="lt1" tx1="dk1" bg2="lt2" tx2="dk2" accent1="accent1" accent2="accent2" accent3="accent3" accent4="accent4" accent5="accent5" accent6="accent6" hlink="hlink" folHlink="folHlink"/>
   <c:chart>
-    <c:autoTitleDeleted val="0"/>
+    <c:autoTitleDeleted val="1"/>
     <c:plotArea>
       <c:layout/>
       <c:barChart>
         <c:barDir val="bar"/>
-        <c:grouping val="stacked"/>
+        <c:grouping val="clustered"/>
         <c:varyColors val="0"/>
         <c:ser>
           <c:idx val="0"/>
@@ -172,7 +172,7 @@
               <c:strCache>
                 <c:ptCount val="1"/>
                 <c:pt idx="0">
-                  <c:v>New Testament</c:v>
+                  <c:v>Series 1</c:v>
                 </c:pt>
               </c:strCache>
             </c:strRef>
@@ -190,6 +190,14 @@
             <c:idx val="0"/>
             <c:invertIfNegative val="0"/>
             <c:bubble3D val="0"/>
+            <c:spPr>
+              <a:solidFill>
+                <a:srgbClr val="C00002"/>
+              </a:solidFill>
+              <a:ln w="25400">
+                <a:noFill/>
+              </a:ln>
+            </c:spPr>
             <c:extLst>
               <c:ext xmlns:c16="http://schemas.microsoft.com/office/drawing/2014/chart" uri="{C3380CC4-5D6E-409C-BE32-E72D297353CC}">
                 <c16:uniqueId val="{0000000A-1B33-5944-93E6-FAE2DF40E450}"/>
@@ -216,241 +224,107 @@
               </c:ext>
             </c:extLst>
           </c:dPt>
+          <c:dLbls>
+            <c:dLbl>
+              <c:idx val="0"/>
+              <c:layout>
+                <c:manualLayout>
+                  <c:x val="-9.4901331777972199E-4"/>
+                  <c:y val="0"/>
+                </c:manualLayout>
+              </c:layout>
+              <c:dLblPos val="outEnd"/>
+              <c:showLegendKey val="0"/>
+              <c:showVal val="1"/>
+              <c:showCatName val="0"/>
+              <c:showSerName val="0"/>
+              <c:showPercent val="0"/>
+              <c:showBubbleSize val="0"/>
+              <c:extLst>
+                <c:ext xmlns:c15="http://schemas.microsoft.com/office/drawing/2012/chart" uri="{CE6537A1-D6FC-4f65-9D91-7224C49458BB}"/>
+                <c:ext xmlns:c16="http://schemas.microsoft.com/office/drawing/2014/chart" uri="{C3380CC4-5D6E-409C-BE32-E72D297353CC}">
+                  <c16:uniqueId val="{0000000A-1B33-5944-93E6-FAE2DF40E450}"/>
+                </c:ext>
+              </c:extLst>
+            </c:dLbl>
+            <c:spPr>
+              <a:noFill/>
+              <a:ln>
+                <a:noFill/>
+              </a:ln>
+              <a:effectLst/>
+            </c:spPr>
+            <c:txPr>
+              <a:bodyPr/>
+              <a:lstStyle/>
+              <a:p>
+                <a:pPr>
+                  <a:defRPr b="1">
+                    <a:solidFill>
+                      <a:schemeClr val="bg1"/>
+                    </a:solidFill>
+                  </a:defRPr>
+                </a:pPr>
+                <a:endParaRPr lang="en-US"/>
+              </a:p>
+            </c:txPr>
+            <c:dLblPos val="inEnd"/>
+            <c:showLegendKey val="0"/>
+            <c:showVal val="1"/>
+            <c:showCatName val="0"/>
+            <c:showSerName val="0"/>
+            <c:showPercent val="0"/>
+            <c:showBubbleSize val="0"/>
+            <c:showLeaderLines val="0"/>
+            <c:extLst>
+              <c:ext xmlns:c15="http://schemas.microsoft.com/office/drawing/2012/chart" uri="{CE6537A1-D6FC-4f65-9D91-7224C49458BB}">
+                <c15:showLeaderLines val="0"/>
+              </c:ext>
+            </c:extLst>
+          </c:dLbls>
           <c:cat>
             <c:strRef>
-              <c:f>Sheet1!$A$2:$A$38</c:f>
+              <c:f>Sheet1!$A$2:$A$6</c:f>
               <c:strCache>
-                <c:ptCount val="37"/>
+                <c:ptCount val="5"/>
                 <c:pt idx="0">
-                  <c:v>Gospel of Truth</c:v>
+                  <c:v>Apocryphal</c:v>
                 </c:pt>
                 <c:pt idx="1">
-                  <c:v>Gospel of the Egyptians</c:v>
+                  <c:v>Mark</c:v>
                 </c:pt>
                 <c:pt idx="2">
-                  <c:v>Traditions of Matthias</c:v>
+                  <c:v>John</c:v>
                 </c:pt>
                 <c:pt idx="3">
-                  <c:v>Gospel of the Hebrews</c:v>
+                  <c:v>Luke</c:v>
                 </c:pt>
                 <c:pt idx="4">
-                  <c:v>Preaching of Peter</c:v>
-                </c:pt>
-                <c:pt idx="5">
-                  <c:v>Didache</c:v>
-                </c:pt>
-                <c:pt idx="6">
-                  <c:v>Apocalypse of Peter</c:v>
-                </c:pt>
-                <c:pt idx="7">
-                  <c:v>I Clement</c:v>
-                </c:pt>
-                <c:pt idx="8">
-                  <c:v>Epistle of Barnabas</c:v>
-                </c:pt>
-                <c:pt idx="9">
-                  <c:v>III John</c:v>
-                </c:pt>
-                <c:pt idx="10">
-                  <c:v>Shepherd of Hermas</c:v>
-                </c:pt>
-                <c:pt idx="11">
-                  <c:v>II Peter</c:v>
-                </c:pt>
-                <c:pt idx="12">
-                  <c:v>James</c:v>
-                </c:pt>
-                <c:pt idx="13">
-                  <c:v>II John</c:v>
-                </c:pt>
-                <c:pt idx="14">
-                  <c:v>Philemon</c:v>
-                </c:pt>
-                <c:pt idx="15">
-                  <c:v>Jude</c:v>
-                </c:pt>
-                <c:pt idx="16">
-                  <c:v>Hebrews</c:v>
-                </c:pt>
-                <c:pt idx="17">
-                  <c:v>Revelation of John</c:v>
-                </c:pt>
-                <c:pt idx="18">
-                  <c:v>Titus</c:v>
-                </c:pt>
-                <c:pt idx="19">
-                  <c:v>I Timothy</c:v>
-                </c:pt>
-                <c:pt idx="20">
-                  <c:v>II Timothy</c:v>
-                </c:pt>
-                <c:pt idx="21">
-                  <c:v>I Peter</c:v>
-                </c:pt>
-                <c:pt idx="22">
-                  <c:v>Gospel according to John</c:v>
-                </c:pt>
-                <c:pt idx="23">
-                  <c:v>Acts</c:v>
-                </c:pt>
-                <c:pt idx="24">
-                  <c:v>II Thessalonians</c:v>
-                </c:pt>
-                <c:pt idx="25">
-                  <c:v>I John</c:v>
-                </c:pt>
-                <c:pt idx="26">
-                  <c:v>Gospel according to Mark</c:v>
-                </c:pt>
-                <c:pt idx="27">
-                  <c:v>II Corinthians</c:v>
-                </c:pt>
-                <c:pt idx="28">
-                  <c:v>Galatians</c:v>
-                </c:pt>
-                <c:pt idx="29">
-                  <c:v>Philippians</c:v>
-                </c:pt>
-                <c:pt idx="30">
-                  <c:v>Colossians</c:v>
-                </c:pt>
-                <c:pt idx="31">
-                  <c:v>I Thessalonians</c:v>
-                </c:pt>
-                <c:pt idx="32">
-                  <c:v>Gospel according to Matthew</c:v>
-                </c:pt>
-                <c:pt idx="33">
-                  <c:v>Romans</c:v>
-                </c:pt>
-                <c:pt idx="34">
-                  <c:v>I Corinthians</c:v>
-                </c:pt>
-                <c:pt idx="35">
-                  <c:v>Ephesians</c:v>
-                </c:pt>
-                <c:pt idx="36">
-                  <c:v>Gospel according to Luke</c:v>
+                  <c:v>Matthew</c:v>
                 </c:pt>
               </c:strCache>
             </c:strRef>
           </c:cat>
           <c:val>
             <c:numRef>
-              <c:f>Sheet1!$B$2:$B$38</c:f>
+              <c:f>Sheet1!$B$2:$B$6</c:f>
               <c:numCache>
                 <c:formatCode>General</c:formatCode>
-                <c:ptCount val="37"/>
+                <c:ptCount val="5"/>
                 <c:pt idx="0">
-                  <c:v>0</c:v>
+                  <c:v>16</c:v>
                 </c:pt>
                 <c:pt idx="1">
-                  <c:v>0</c:v>
+                  <c:v>182</c:v>
                 </c:pt>
                 <c:pt idx="2">
-                  <c:v>0</c:v>
+                  <c:v>331</c:v>
                 </c:pt>
                 <c:pt idx="3">
-                  <c:v>0</c:v>
+                  <c:v>402</c:v>
                 </c:pt>
                 <c:pt idx="4">
-                  <c:v>0</c:v>
-                </c:pt>
-                <c:pt idx="5">
-                  <c:v>0</c:v>
-                </c:pt>
-                <c:pt idx="6">
-                  <c:v>0</c:v>
-                </c:pt>
-                <c:pt idx="7">
-                  <c:v>0</c:v>
-                </c:pt>
-                <c:pt idx="8">
-                  <c:v>0</c:v>
-                </c:pt>
-                <c:pt idx="9">
-                  <c:v>3</c:v>
-                </c:pt>
-                <c:pt idx="10">
-                  <c:v>0</c:v>
-                </c:pt>
-                <c:pt idx="11">
-                  <c:v>4</c:v>
-                </c:pt>
-                <c:pt idx="12">
-                  <c:v>5</c:v>
-                </c:pt>
-                <c:pt idx="13">
-                  <c:v>5</c:v>
-                </c:pt>
-                <c:pt idx="14">
-                  <c:v>9</c:v>
-                </c:pt>
-                <c:pt idx="15">
-                  <c:v>9</c:v>
-                </c:pt>
-                <c:pt idx="16">
-                  <c:v>10</c:v>
-                </c:pt>
-                <c:pt idx="17">
-                  <c:v>10</c:v>
-                </c:pt>
-                <c:pt idx="18">
-                  <c:v>11</c:v>
-                </c:pt>
-                <c:pt idx="19">
-                  <c:v>12</c:v>
-                </c:pt>
-                <c:pt idx="20">
-                  <c:v>12</c:v>
-                </c:pt>
-                <c:pt idx="21">
-                  <c:v>12</c:v>
-                </c:pt>
-                <c:pt idx="22">
-                  <c:v>13</c:v>
-                </c:pt>
-                <c:pt idx="23">
-                  <c:v>13</c:v>
-                </c:pt>
-                <c:pt idx="24">
-                  <c:v>13</c:v>
-                </c:pt>
-                <c:pt idx="25">
-                  <c:v>13</c:v>
-                </c:pt>
-                <c:pt idx="26">
-                  <c:v>14</c:v>
-                </c:pt>
-                <c:pt idx="27">
-                  <c:v>14</c:v>
-                </c:pt>
-                <c:pt idx="28">
-                  <c:v>14</c:v>
-                </c:pt>
-                <c:pt idx="29">
-                  <c:v>14</c:v>
-                </c:pt>
-                <c:pt idx="30">
-                  <c:v>14</c:v>
-                </c:pt>
-                <c:pt idx="31">
-                  <c:v>14</c:v>
-                </c:pt>
-                <c:pt idx="32">
-                  <c:v>15</c:v>
-                </c:pt>
-                <c:pt idx="33">
-                  <c:v>15</c:v>
-                </c:pt>
-                <c:pt idx="34">
-                  <c:v>15</c:v>
-                </c:pt>
-                <c:pt idx="35">
-                  <c:v>15</c:v>
-                </c:pt>
-                <c:pt idx="36">
-                  <c:v>16</c:v>
+                  <c:v>757</c:v>
                 </c:pt>
               </c:numCache>
             </c:numRef>
@@ -458,304 +332,6 @@
           <c:extLst>
             <c:ext xmlns:c16="http://schemas.microsoft.com/office/drawing/2014/chart" uri="{C3380CC4-5D6E-409C-BE32-E72D297353CC}">
               <c16:uniqueId val="{00000000-56D6-774A-AEC1-01E5BF60A988}"/>
-            </c:ext>
-          </c:extLst>
-        </c:ser>
-        <c:ser>
-          <c:idx val="1"/>
-          <c:order val="1"/>
-          <c:tx>
-            <c:strRef>
-              <c:f>Sheet1!$C$1</c:f>
-              <c:strCache>
-                <c:ptCount val="1"/>
-                <c:pt idx="0">
-                  <c:v>Non-canonical</c:v>
-                </c:pt>
-              </c:strCache>
-            </c:strRef>
-          </c:tx>
-          <c:spPr>
-            <a:solidFill>
-              <a:srgbClr val="CA5C0E"/>
-            </a:solidFill>
-            <a:ln>
-              <a:noFill/>
-            </a:ln>
-          </c:spPr>
-          <c:invertIfNegative val="0"/>
-          <c:dPt>
-            <c:idx val="0"/>
-            <c:invertIfNegative val="0"/>
-            <c:bubble3D val="0"/>
-            <c:extLst>
-              <c:ext xmlns:c16="http://schemas.microsoft.com/office/drawing/2014/chart" uri="{C3380CC4-5D6E-409C-BE32-E72D297353CC}">
-                <c16:uniqueId val="{00000009-1B33-5944-93E6-FAE2DF40E450}"/>
-              </c:ext>
-            </c:extLst>
-          </c:dPt>
-          <c:dPt>
-            <c:idx val="1"/>
-            <c:invertIfNegative val="0"/>
-            <c:bubble3D val="0"/>
-            <c:extLst>
-              <c:ext xmlns:c16="http://schemas.microsoft.com/office/drawing/2014/chart" uri="{C3380CC4-5D6E-409C-BE32-E72D297353CC}">
-                <c16:uniqueId val="{00000007-1B33-5944-93E6-FAE2DF40E450}"/>
-              </c:ext>
-            </c:extLst>
-          </c:dPt>
-          <c:dPt>
-            <c:idx val="2"/>
-            <c:invertIfNegative val="0"/>
-            <c:bubble3D val="0"/>
-            <c:extLst>
-              <c:ext xmlns:c16="http://schemas.microsoft.com/office/drawing/2014/chart" uri="{C3380CC4-5D6E-409C-BE32-E72D297353CC}">
-                <c16:uniqueId val="{00000005-1B33-5944-93E6-FAE2DF40E450}"/>
-              </c:ext>
-            </c:extLst>
-          </c:dPt>
-          <c:cat>
-            <c:strRef>
-              <c:f>Sheet1!$A$2:$A$38</c:f>
-              <c:strCache>
-                <c:ptCount val="37"/>
-                <c:pt idx="0">
-                  <c:v>Gospel of Truth</c:v>
-                </c:pt>
-                <c:pt idx="1">
-                  <c:v>Gospel of the Egyptians</c:v>
-                </c:pt>
-                <c:pt idx="2">
-                  <c:v>Traditions of Matthias</c:v>
-                </c:pt>
-                <c:pt idx="3">
-                  <c:v>Gospel of the Hebrews</c:v>
-                </c:pt>
-                <c:pt idx="4">
-                  <c:v>Preaching of Peter</c:v>
-                </c:pt>
-                <c:pt idx="5">
-                  <c:v>Didache</c:v>
-                </c:pt>
-                <c:pt idx="6">
-                  <c:v>Apocalypse of Peter</c:v>
-                </c:pt>
-                <c:pt idx="7">
-                  <c:v>I Clement</c:v>
-                </c:pt>
-                <c:pt idx="8">
-                  <c:v>Epistle of Barnabas</c:v>
-                </c:pt>
-                <c:pt idx="9">
-                  <c:v>III John</c:v>
-                </c:pt>
-                <c:pt idx="10">
-                  <c:v>Shepherd of Hermas</c:v>
-                </c:pt>
-                <c:pt idx="11">
-                  <c:v>II Peter</c:v>
-                </c:pt>
-                <c:pt idx="12">
-                  <c:v>James</c:v>
-                </c:pt>
-                <c:pt idx="13">
-                  <c:v>II John</c:v>
-                </c:pt>
-                <c:pt idx="14">
-                  <c:v>Philemon</c:v>
-                </c:pt>
-                <c:pt idx="15">
-                  <c:v>Jude</c:v>
-                </c:pt>
-                <c:pt idx="16">
-                  <c:v>Hebrews</c:v>
-                </c:pt>
-                <c:pt idx="17">
-                  <c:v>Revelation of John</c:v>
-                </c:pt>
-                <c:pt idx="18">
-                  <c:v>Titus</c:v>
-                </c:pt>
-                <c:pt idx="19">
-                  <c:v>I Timothy</c:v>
-                </c:pt>
-                <c:pt idx="20">
-                  <c:v>II Timothy</c:v>
-                </c:pt>
-                <c:pt idx="21">
-                  <c:v>I Peter</c:v>
-                </c:pt>
-                <c:pt idx="22">
-                  <c:v>Gospel according to John</c:v>
-                </c:pt>
-                <c:pt idx="23">
-                  <c:v>Acts</c:v>
-                </c:pt>
-                <c:pt idx="24">
-                  <c:v>II Thessalonians</c:v>
-                </c:pt>
-                <c:pt idx="25">
-                  <c:v>I John</c:v>
-                </c:pt>
-                <c:pt idx="26">
-                  <c:v>Gospel according to Mark</c:v>
-                </c:pt>
-                <c:pt idx="27">
-                  <c:v>II Corinthians</c:v>
-                </c:pt>
-                <c:pt idx="28">
-                  <c:v>Galatians</c:v>
-                </c:pt>
-                <c:pt idx="29">
-                  <c:v>Philippians</c:v>
-                </c:pt>
-                <c:pt idx="30">
-                  <c:v>Colossians</c:v>
-                </c:pt>
-                <c:pt idx="31">
-                  <c:v>I Thessalonians</c:v>
-                </c:pt>
-                <c:pt idx="32">
-                  <c:v>Gospel according to Matthew</c:v>
-                </c:pt>
-                <c:pt idx="33">
-                  <c:v>Romans</c:v>
-                </c:pt>
-                <c:pt idx="34">
-                  <c:v>I Corinthians</c:v>
-                </c:pt>
-                <c:pt idx="35">
-                  <c:v>Ephesians</c:v>
-                </c:pt>
-                <c:pt idx="36">
-                  <c:v>Gospel according to Luke</c:v>
-                </c:pt>
-              </c:strCache>
-            </c:strRef>
-          </c:cat>
-          <c:val>
-            <c:numRef>
-              <c:f>Sheet1!$C$2:$C$38</c:f>
-              <c:numCache>
-                <c:formatCode>General</c:formatCode>
-                <c:ptCount val="37"/>
-                <c:pt idx="0">
-                  <c:v>1</c:v>
-                </c:pt>
-                <c:pt idx="1">
-                  <c:v>1</c:v>
-                </c:pt>
-                <c:pt idx="2">
-                  <c:v>1</c:v>
-                </c:pt>
-                <c:pt idx="3">
-                  <c:v>2</c:v>
-                </c:pt>
-                <c:pt idx="4">
-                  <c:v>2</c:v>
-                </c:pt>
-                <c:pt idx="5">
-                  <c:v>2</c:v>
-                </c:pt>
-                <c:pt idx="6">
-                  <c:v>2</c:v>
-                </c:pt>
-                <c:pt idx="7">
-                  <c:v>3</c:v>
-                </c:pt>
-                <c:pt idx="8">
-                  <c:v>3</c:v>
-                </c:pt>
-                <c:pt idx="9">
-                  <c:v>0</c:v>
-                </c:pt>
-                <c:pt idx="10">
-                  <c:v>4</c:v>
-                </c:pt>
-                <c:pt idx="11">
-                  <c:v>0</c:v>
-                </c:pt>
-                <c:pt idx="12">
-                  <c:v>0</c:v>
-                </c:pt>
-                <c:pt idx="13">
-                  <c:v>0</c:v>
-                </c:pt>
-                <c:pt idx="14">
-                  <c:v>0</c:v>
-                </c:pt>
-                <c:pt idx="15">
-                  <c:v>0</c:v>
-                </c:pt>
-                <c:pt idx="16">
-                  <c:v>0</c:v>
-                </c:pt>
-                <c:pt idx="17">
-                  <c:v>0</c:v>
-                </c:pt>
-                <c:pt idx="18">
-                  <c:v>0</c:v>
-                </c:pt>
-                <c:pt idx="19">
-                  <c:v>0</c:v>
-                </c:pt>
-                <c:pt idx="20">
-                  <c:v>0</c:v>
-                </c:pt>
-                <c:pt idx="21">
-                  <c:v>0</c:v>
-                </c:pt>
-                <c:pt idx="22">
-                  <c:v>0</c:v>
-                </c:pt>
-                <c:pt idx="23">
-                  <c:v>0</c:v>
-                </c:pt>
-                <c:pt idx="24">
-                  <c:v>0</c:v>
-                </c:pt>
-                <c:pt idx="25">
-                  <c:v>0</c:v>
-                </c:pt>
-                <c:pt idx="26">
-                  <c:v>0</c:v>
-                </c:pt>
-                <c:pt idx="27">
-                  <c:v>0</c:v>
-                </c:pt>
-                <c:pt idx="28">
-                  <c:v>0</c:v>
-                </c:pt>
-                <c:pt idx="29">
-                  <c:v>0</c:v>
-                </c:pt>
-                <c:pt idx="30">
-                  <c:v>0</c:v>
-                </c:pt>
-                <c:pt idx="31">
-                  <c:v>0</c:v>
-                </c:pt>
-                <c:pt idx="32">
-                  <c:v>0</c:v>
-                </c:pt>
-                <c:pt idx="33">
-                  <c:v>0</c:v>
-                </c:pt>
-                <c:pt idx="34">
-                  <c:v>0</c:v>
-                </c:pt>
-                <c:pt idx="35">
-                  <c:v>0</c:v>
-                </c:pt>
-                <c:pt idx="36">
-                  <c:v>0</c:v>
-                </c:pt>
-              </c:numCache>
-            </c:numRef>
-          </c:val>
-          <c:extLst>
-            <c:ext xmlns:c16="http://schemas.microsoft.com/office/drawing/2014/chart" uri="{C3380CC4-5D6E-409C-BE32-E72D297353CC}">
-              <c16:uniqueId val="{00000004-1B33-5944-93E6-FAE2DF40E450}"/>
             </c:ext>
           </c:extLst>
         </c:ser>
@@ -767,8 +343,7 @@
           <c:showPercent val="0"/>
           <c:showBubbleSize val="0"/>
         </c:dLbls>
-        <c:gapWidth val="70"/>
-        <c:overlap val="100"/>
+        <c:gapWidth val="100"/>
         <c:axId val="790563136"/>
         <c:axId val="768197296"/>
       </c:barChart>
@@ -799,7 +374,7 @@
           <a:lstStyle/>
           <a:p>
             <a:pPr>
-              <a:defRPr sz="800" baseline="0">
+              <a:defRPr baseline="0">
                 <a:solidFill>
                   <a:schemeClr val="bg1"/>
                 </a:solidFill>
@@ -844,24 +419,6 @@
         <c:crossBetween val="between"/>
       </c:valAx>
     </c:plotArea>
-    <c:legend>
-      <c:legendPos val="r"/>
-      <c:overlay val="1"/>
-      <c:txPr>
-        <a:bodyPr/>
-        <a:lstStyle/>
-        <a:p>
-          <a:pPr>
-            <a:defRPr>
-              <a:solidFill>
-                <a:schemeClr val="bg1"/>
-              </a:solidFill>
-            </a:defRPr>
-          </a:pPr>
-          <a:endParaRPr lang="en-US"/>
-        </a:p>
-      </c:txPr>
-    </c:legend>
     <c:plotVisOnly val="1"/>
     <c:dispBlanksAs val="gap"/>
     <c:showDLblsOverMax val="0"/>
@@ -913,7 +470,7 @@
               <c:strCache>
                 <c:ptCount val="1"/>
                 <c:pt idx="0">
-                  <c:v>Gospels</c:v>
+                  <c:v>New Testament</c:v>
                 </c:pt>
               </c:strCache>
             </c:strRef>
@@ -957,82 +514,241 @@
               </c:ext>
             </c:extLst>
           </c:dPt>
-          <c:dLbls>
-            <c:spPr>
-              <a:noFill/>
-              <a:ln>
-                <a:noFill/>
-              </a:ln>
-              <a:effectLst/>
-            </c:spPr>
-            <c:txPr>
-              <a:bodyPr/>
-              <a:lstStyle/>
-              <a:p>
-                <a:pPr>
-                  <a:defRPr b="1">
-                    <a:solidFill>
-                      <a:schemeClr val="bg1"/>
-                    </a:solidFill>
-                  </a:defRPr>
-                </a:pPr>
-                <a:endParaRPr lang="en-US"/>
-              </a:p>
-            </c:txPr>
-            <c:dLblPos val="inEnd"/>
-            <c:showLegendKey val="0"/>
-            <c:showVal val="1"/>
-            <c:showCatName val="0"/>
-            <c:showSerName val="0"/>
-            <c:showPercent val="0"/>
-            <c:showBubbleSize val="0"/>
-            <c:showLeaderLines val="0"/>
-            <c:extLst>
-              <c:ext xmlns:c15="http://schemas.microsoft.com/office/drawing/2012/chart" uri="{CE6537A1-D6FC-4f65-9D91-7224C49458BB}">
-                <c15:showLeaderLines val="0"/>
-              </c:ext>
-            </c:extLst>
-          </c:dLbls>
           <c:cat>
             <c:strRef>
-              <c:f>Sheet1!$A$2:$A$6</c:f>
+              <c:f>Sheet1!$A$2:$A$38</c:f>
               <c:strCache>
-                <c:ptCount val="5"/>
+                <c:ptCount val="37"/>
                 <c:pt idx="0">
-                  <c:v>Apocryphal</c:v>
+                  <c:v>Gospel of Truth</c:v>
                 </c:pt>
                 <c:pt idx="1">
-                  <c:v>Mark</c:v>
+                  <c:v>Gospel of the Egyptians</c:v>
                 </c:pt>
                 <c:pt idx="2">
-                  <c:v>John</c:v>
+                  <c:v>Traditions of Matthias</c:v>
                 </c:pt>
                 <c:pt idx="3">
-                  <c:v>Luke</c:v>
+                  <c:v>Gospel of the Hebrews</c:v>
                 </c:pt>
                 <c:pt idx="4">
-                  <c:v>Matthew</c:v>
+                  <c:v>Preaching of Peter</c:v>
+                </c:pt>
+                <c:pt idx="5">
+                  <c:v>Didache</c:v>
+                </c:pt>
+                <c:pt idx="6">
+                  <c:v>Apocalypse of Peter</c:v>
+                </c:pt>
+                <c:pt idx="7">
+                  <c:v>I Clement</c:v>
+                </c:pt>
+                <c:pt idx="8">
+                  <c:v>Epistle of Barnabas</c:v>
+                </c:pt>
+                <c:pt idx="9">
+                  <c:v>III John</c:v>
+                </c:pt>
+                <c:pt idx="10">
+                  <c:v>Shepherd of Hermas</c:v>
+                </c:pt>
+                <c:pt idx="11">
+                  <c:v>II Peter</c:v>
+                </c:pt>
+                <c:pt idx="12">
+                  <c:v>James</c:v>
+                </c:pt>
+                <c:pt idx="13">
+                  <c:v>II John</c:v>
+                </c:pt>
+                <c:pt idx="14">
+                  <c:v>Philemon</c:v>
+                </c:pt>
+                <c:pt idx="15">
+                  <c:v>Jude</c:v>
+                </c:pt>
+                <c:pt idx="16">
+                  <c:v>Hebrews</c:v>
+                </c:pt>
+                <c:pt idx="17">
+                  <c:v>Revelation of John</c:v>
+                </c:pt>
+                <c:pt idx="18">
+                  <c:v>Titus</c:v>
+                </c:pt>
+                <c:pt idx="19">
+                  <c:v>I Timothy</c:v>
+                </c:pt>
+                <c:pt idx="20">
+                  <c:v>II Timothy</c:v>
+                </c:pt>
+                <c:pt idx="21">
+                  <c:v>I Peter</c:v>
+                </c:pt>
+                <c:pt idx="22">
+                  <c:v>Gospel according to John</c:v>
+                </c:pt>
+                <c:pt idx="23">
+                  <c:v>Acts</c:v>
+                </c:pt>
+                <c:pt idx="24">
+                  <c:v>II Thessalonians</c:v>
+                </c:pt>
+                <c:pt idx="25">
+                  <c:v>I John</c:v>
+                </c:pt>
+                <c:pt idx="26">
+                  <c:v>Gospel according to Mark</c:v>
+                </c:pt>
+                <c:pt idx="27">
+                  <c:v>II Corinthians</c:v>
+                </c:pt>
+                <c:pt idx="28">
+                  <c:v>Galatians</c:v>
+                </c:pt>
+                <c:pt idx="29">
+                  <c:v>Philippians</c:v>
+                </c:pt>
+                <c:pt idx="30">
+                  <c:v>Colossians</c:v>
+                </c:pt>
+                <c:pt idx="31">
+                  <c:v>I Thessalonians</c:v>
+                </c:pt>
+                <c:pt idx="32">
+                  <c:v>Gospel according to Matthew</c:v>
+                </c:pt>
+                <c:pt idx="33">
+                  <c:v>Romans</c:v>
+                </c:pt>
+                <c:pt idx="34">
+                  <c:v>I Corinthians</c:v>
+                </c:pt>
+                <c:pt idx="35">
+                  <c:v>Ephesians</c:v>
+                </c:pt>
+                <c:pt idx="36">
+                  <c:v>Gospel according to Luke</c:v>
                 </c:pt>
               </c:strCache>
             </c:strRef>
           </c:cat>
           <c:val>
             <c:numRef>
-              <c:f>Sheet1!$B$2:$B$6</c:f>
+              <c:f>Sheet1!$B$2:$B$38</c:f>
               <c:numCache>
                 <c:formatCode>General</c:formatCode>
-                <c:ptCount val="5"/>
+                <c:ptCount val="37"/>
+                <c:pt idx="0">
+                  <c:v>0</c:v>
+                </c:pt>
                 <c:pt idx="1">
-                  <c:v>182</c:v>
+                  <c:v>0</c:v>
                 </c:pt>
                 <c:pt idx="2">
-                  <c:v>331</c:v>
+                  <c:v>0</c:v>
                 </c:pt>
                 <c:pt idx="3">
-                  <c:v>402</c:v>
+                  <c:v>0</c:v>
                 </c:pt>
                 <c:pt idx="4">
-                  <c:v>757</c:v>
+                  <c:v>0</c:v>
+                </c:pt>
+                <c:pt idx="5">
+                  <c:v>0</c:v>
+                </c:pt>
+                <c:pt idx="6">
+                  <c:v>0</c:v>
+                </c:pt>
+                <c:pt idx="7">
+                  <c:v>0</c:v>
+                </c:pt>
+                <c:pt idx="8">
+                  <c:v>0</c:v>
+                </c:pt>
+                <c:pt idx="9">
+                  <c:v>3</c:v>
+                </c:pt>
+                <c:pt idx="10">
+                  <c:v>0</c:v>
+                </c:pt>
+                <c:pt idx="11">
+                  <c:v>4</c:v>
+                </c:pt>
+                <c:pt idx="12">
+                  <c:v>5</c:v>
+                </c:pt>
+                <c:pt idx="13">
+                  <c:v>5</c:v>
+                </c:pt>
+                <c:pt idx="14">
+                  <c:v>9</c:v>
+                </c:pt>
+                <c:pt idx="15">
+                  <c:v>9</c:v>
+                </c:pt>
+                <c:pt idx="16">
+                  <c:v>10</c:v>
+                </c:pt>
+                <c:pt idx="17">
+                  <c:v>10</c:v>
+                </c:pt>
+                <c:pt idx="18">
+                  <c:v>11</c:v>
+                </c:pt>
+                <c:pt idx="19">
+                  <c:v>12</c:v>
+                </c:pt>
+                <c:pt idx="20">
+                  <c:v>12</c:v>
+                </c:pt>
+                <c:pt idx="21">
+                  <c:v>12</c:v>
+                </c:pt>
+                <c:pt idx="22">
+                  <c:v>13</c:v>
+                </c:pt>
+                <c:pt idx="23">
+                  <c:v>13</c:v>
+                </c:pt>
+                <c:pt idx="24">
+                  <c:v>13</c:v>
+                </c:pt>
+                <c:pt idx="25">
+                  <c:v>13</c:v>
+                </c:pt>
+                <c:pt idx="26">
+                  <c:v>14</c:v>
+                </c:pt>
+                <c:pt idx="27">
+                  <c:v>14</c:v>
+                </c:pt>
+                <c:pt idx="28">
+                  <c:v>14</c:v>
+                </c:pt>
+                <c:pt idx="29">
+                  <c:v>14</c:v>
+                </c:pt>
+                <c:pt idx="30">
+                  <c:v>14</c:v>
+                </c:pt>
+                <c:pt idx="31">
+                  <c:v>14</c:v>
+                </c:pt>
+                <c:pt idx="32">
+                  <c:v>15</c:v>
+                </c:pt>
+                <c:pt idx="33">
+                  <c:v>15</c:v>
+                </c:pt>
+                <c:pt idx="34">
+                  <c:v>15</c:v>
+                </c:pt>
+                <c:pt idx="35">
+                  <c:v>15</c:v>
+                </c:pt>
+                <c:pt idx="36">
+                  <c:v>16</c:v>
                 </c:pt>
               </c:numCache>
             </c:numRef>
@@ -1052,7 +768,7 @@
               <c:strCache>
                 <c:ptCount val="1"/>
                 <c:pt idx="0">
-                  <c:v>Apocryphal</c:v>
+                  <c:v>Non-canonical</c:v>
                 </c:pt>
               </c:strCache>
             </c:strRef>
@@ -1096,171 +812,241 @@
               </c:ext>
             </c:extLst>
           </c:dPt>
-          <c:dLbls>
-            <c:dLbl>
-              <c:idx val="0"/>
-              <c:layout>
-                <c:manualLayout>
-                  <c:x val="2.3602362204724409E-2"/>
-                  <c:y val="0"/>
-                </c:manualLayout>
-              </c:layout>
-              <c:dLblPos val="ctr"/>
-              <c:showLegendKey val="0"/>
-              <c:showVal val="1"/>
-              <c:showCatName val="0"/>
-              <c:showSerName val="0"/>
-              <c:showPercent val="0"/>
-              <c:showBubbleSize val="0"/>
-              <c:extLst>
-                <c:ext xmlns:c15="http://schemas.microsoft.com/office/drawing/2012/chart" uri="{CE6537A1-D6FC-4f65-9D91-7224C49458BB}"/>
-                <c:ext xmlns:c16="http://schemas.microsoft.com/office/drawing/2014/chart" uri="{C3380CC4-5D6E-409C-BE32-E72D297353CC}">
-                  <c16:uniqueId val="{00000009-1B33-5944-93E6-FAE2DF40E450}"/>
-                </c:ext>
-              </c:extLst>
-            </c:dLbl>
-            <c:dLbl>
-              <c:idx val="1"/>
-              <c:tx>
-                <c:rich>
-                  <a:bodyPr/>
-                  <a:lstStyle/>
-                  <a:p>
-                    <a:fld id="{33DDEA5E-53BD-2241-8A3C-2C03F088DBCC}" type="VALUE">
-                      <a:rPr lang="en-US" b="1">
-                        <a:solidFill>
-                          <a:schemeClr val="bg1"/>
-                        </a:solidFill>
-                      </a:rPr>
-                      <a:pPr/>
-                      <a:t>[VALUE]</a:t>
-                    </a:fld>
-                    <a:endParaRPr lang="en-US"/>
-                  </a:p>
-                </c:rich>
-              </c:tx>
-              <c:dLblPos val="inEnd"/>
-              <c:showLegendKey val="0"/>
-              <c:showVal val="1"/>
-              <c:showCatName val="0"/>
-              <c:showSerName val="0"/>
-              <c:showPercent val="0"/>
-              <c:showBubbleSize val="0"/>
-              <c:extLst>
-                <c:ext xmlns:c15="http://schemas.microsoft.com/office/drawing/2012/chart" uri="{CE6537A1-D6FC-4f65-9D91-7224C49458BB}">
-                  <c15:dlblFieldTable/>
-                  <c15:showDataLabelsRange val="0"/>
-                </c:ext>
-                <c:ext xmlns:c16="http://schemas.microsoft.com/office/drawing/2014/chart" uri="{C3380CC4-5D6E-409C-BE32-E72D297353CC}">
-                  <c16:uniqueId val="{00000007-1B33-5944-93E6-FAE2DF40E450}"/>
-                </c:ext>
-              </c:extLst>
-            </c:dLbl>
-            <c:dLbl>
-              <c:idx val="2"/>
-              <c:tx>
-                <c:rich>
-                  <a:bodyPr/>
-                  <a:lstStyle/>
-                  <a:p>
-                    <a:fld id="{CB453A95-C41C-3E41-BFD1-2C6C7F843D8A}" type="VALUE">
-                      <a:rPr lang="en-US">
-                        <a:solidFill>
-                          <a:schemeClr val="bg1"/>
-                        </a:solidFill>
-                      </a:rPr>
-                      <a:pPr/>
-                      <a:t>[VALUE]</a:t>
-                    </a:fld>
-                    <a:endParaRPr lang="en-US"/>
-                  </a:p>
-                </c:rich>
-              </c:tx>
-              <c:dLblPos val="inEnd"/>
-              <c:showLegendKey val="0"/>
-              <c:showVal val="1"/>
-              <c:showCatName val="0"/>
-              <c:showSerName val="0"/>
-              <c:showPercent val="0"/>
-              <c:showBubbleSize val="0"/>
-              <c:extLst>
-                <c:ext xmlns:c15="http://schemas.microsoft.com/office/drawing/2012/chart" uri="{CE6537A1-D6FC-4f65-9D91-7224C49458BB}">
-                  <c15:dlblFieldTable/>
-                  <c15:showDataLabelsRange val="0"/>
-                </c:ext>
-                <c:ext xmlns:c16="http://schemas.microsoft.com/office/drawing/2014/chart" uri="{C3380CC4-5D6E-409C-BE32-E72D297353CC}">
-                  <c16:uniqueId val="{00000005-1B33-5944-93E6-FAE2DF40E450}"/>
-                </c:ext>
-              </c:extLst>
-            </c:dLbl>
-            <c:spPr>
-              <a:noFill/>
-              <a:ln>
-                <a:noFill/>
-              </a:ln>
-              <a:effectLst/>
-            </c:spPr>
-            <c:txPr>
-              <a:bodyPr wrap="square" lIns="38100" tIns="19050" rIns="38100" bIns="19050" anchor="ctr">
-                <a:spAutoFit/>
-              </a:bodyPr>
-              <a:lstStyle/>
-              <a:p>
-                <a:pPr>
-                  <a:defRPr b="1">
-                    <a:solidFill>
-                      <a:schemeClr val="bg1"/>
-                    </a:solidFill>
-                  </a:defRPr>
-                </a:pPr>
-                <a:endParaRPr lang="en-US"/>
-              </a:p>
-            </c:txPr>
-            <c:dLblPos val="inEnd"/>
-            <c:showLegendKey val="0"/>
-            <c:showVal val="1"/>
-            <c:showCatName val="0"/>
-            <c:showSerName val="0"/>
-            <c:showPercent val="0"/>
-            <c:showBubbleSize val="0"/>
-            <c:showLeaderLines val="0"/>
-            <c:extLst>
-              <c:ext xmlns:c15="http://schemas.microsoft.com/office/drawing/2012/chart" uri="{CE6537A1-D6FC-4f65-9D91-7224C49458BB}">
-                <c15:showLeaderLines val="1"/>
-              </c:ext>
-            </c:extLst>
-          </c:dLbls>
           <c:cat>
             <c:strRef>
-              <c:f>Sheet1!$A$2:$A$6</c:f>
+              <c:f>Sheet1!$A$2:$A$38</c:f>
               <c:strCache>
-                <c:ptCount val="5"/>
+                <c:ptCount val="37"/>
                 <c:pt idx="0">
-                  <c:v>Apocryphal</c:v>
+                  <c:v>Gospel of Truth</c:v>
                 </c:pt>
                 <c:pt idx="1">
-                  <c:v>Mark</c:v>
+                  <c:v>Gospel of the Egyptians</c:v>
                 </c:pt>
                 <c:pt idx="2">
-                  <c:v>John</c:v>
+                  <c:v>Traditions of Matthias</c:v>
                 </c:pt>
                 <c:pt idx="3">
-                  <c:v>Luke</c:v>
+                  <c:v>Gospel of the Hebrews</c:v>
                 </c:pt>
                 <c:pt idx="4">
-                  <c:v>Matthew</c:v>
+                  <c:v>Preaching of Peter</c:v>
+                </c:pt>
+                <c:pt idx="5">
+                  <c:v>Didache</c:v>
+                </c:pt>
+                <c:pt idx="6">
+                  <c:v>Apocalypse of Peter</c:v>
+                </c:pt>
+                <c:pt idx="7">
+                  <c:v>I Clement</c:v>
+                </c:pt>
+                <c:pt idx="8">
+                  <c:v>Epistle of Barnabas</c:v>
+                </c:pt>
+                <c:pt idx="9">
+                  <c:v>III John</c:v>
+                </c:pt>
+                <c:pt idx="10">
+                  <c:v>Shepherd of Hermas</c:v>
+                </c:pt>
+                <c:pt idx="11">
+                  <c:v>II Peter</c:v>
+                </c:pt>
+                <c:pt idx="12">
+                  <c:v>James</c:v>
+                </c:pt>
+                <c:pt idx="13">
+                  <c:v>II John</c:v>
+                </c:pt>
+                <c:pt idx="14">
+                  <c:v>Philemon</c:v>
+                </c:pt>
+                <c:pt idx="15">
+                  <c:v>Jude</c:v>
+                </c:pt>
+                <c:pt idx="16">
+                  <c:v>Hebrews</c:v>
+                </c:pt>
+                <c:pt idx="17">
+                  <c:v>Revelation of John</c:v>
+                </c:pt>
+                <c:pt idx="18">
+                  <c:v>Titus</c:v>
+                </c:pt>
+                <c:pt idx="19">
+                  <c:v>I Timothy</c:v>
+                </c:pt>
+                <c:pt idx="20">
+                  <c:v>II Timothy</c:v>
+                </c:pt>
+                <c:pt idx="21">
+                  <c:v>I Peter</c:v>
+                </c:pt>
+                <c:pt idx="22">
+                  <c:v>Gospel according to John</c:v>
+                </c:pt>
+                <c:pt idx="23">
+                  <c:v>Acts</c:v>
+                </c:pt>
+                <c:pt idx="24">
+                  <c:v>II Thessalonians</c:v>
+                </c:pt>
+                <c:pt idx="25">
+                  <c:v>I John</c:v>
+                </c:pt>
+                <c:pt idx="26">
+                  <c:v>Gospel according to Mark</c:v>
+                </c:pt>
+                <c:pt idx="27">
+                  <c:v>II Corinthians</c:v>
+                </c:pt>
+                <c:pt idx="28">
+                  <c:v>Galatians</c:v>
+                </c:pt>
+                <c:pt idx="29">
+                  <c:v>Philippians</c:v>
+                </c:pt>
+                <c:pt idx="30">
+                  <c:v>Colossians</c:v>
+                </c:pt>
+                <c:pt idx="31">
+                  <c:v>I Thessalonians</c:v>
+                </c:pt>
+                <c:pt idx="32">
+                  <c:v>Gospel according to Matthew</c:v>
+                </c:pt>
+                <c:pt idx="33">
+                  <c:v>Romans</c:v>
+                </c:pt>
+                <c:pt idx="34">
+                  <c:v>I Corinthians</c:v>
+                </c:pt>
+                <c:pt idx="35">
+                  <c:v>Ephesians</c:v>
+                </c:pt>
+                <c:pt idx="36">
+                  <c:v>Gospel according to Luke</c:v>
                 </c:pt>
               </c:strCache>
             </c:strRef>
           </c:cat>
           <c:val>
             <c:numRef>
-              <c:f>Sheet1!$C$2:$C$6</c:f>
+              <c:f>Sheet1!$C$2:$C$38</c:f>
               <c:numCache>
                 <c:formatCode>General</c:formatCode>
-                <c:ptCount val="5"/>
+                <c:ptCount val="37"/>
                 <c:pt idx="0">
-                  <c:v>17</c:v>
+                  <c:v>1</c:v>
+                </c:pt>
+                <c:pt idx="1">
+                  <c:v>1</c:v>
+                </c:pt>
+                <c:pt idx="2">
+                  <c:v>1</c:v>
+                </c:pt>
+                <c:pt idx="3">
+                  <c:v>2</c:v>
+                </c:pt>
+                <c:pt idx="4">
+                  <c:v>2</c:v>
+                </c:pt>
+                <c:pt idx="5">
+                  <c:v>2</c:v>
+                </c:pt>
+                <c:pt idx="6">
+                  <c:v>2</c:v>
+                </c:pt>
+                <c:pt idx="7">
+                  <c:v>3</c:v>
+                </c:pt>
+                <c:pt idx="8">
+                  <c:v>3</c:v>
+                </c:pt>
+                <c:pt idx="9">
+                  <c:v>0</c:v>
+                </c:pt>
+                <c:pt idx="10">
+                  <c:v>4</c:v>
+                </c:pt>
+                <c:pt idx="11">
+                  <c:v>0</c:v>
+                </c:pt>
+                <c:pt idx="12">
+                  <c:v>0</c:v>
+                </c:pt>
+                <c:pt idx="13">
+                  <c:v>0</c:v>
+                </c:pt>
+                <c:pt idx="14">
+                  <c:v>0</c:v>
+                </c:pt>
+                <c:pt idx="15">
+                  <c:v>0</c:v>
+                </c:pt>
+                <c:pt idx="16">
+                  <c:v>0</c:v>
+                </c:pt>
+                <c:pt idx="17">
+                  <c:v>0</c:v>
+                </c:pt>
+                <c:pt idx="18">
+                  <c:v>0</c:v>
+                </c:pt>
+                <c:pt idx="19">
+                  <c:v>0</c:v>
+                </c:pt>
+                <c:pt idx="20">
+                  <c:v>0</c:v>
+                </c:pt>
+                <c:pt idx="21">
+                  <c:v>0</c:v>
+                </c:pt>
+                <c:pt idx="22">
+                  <c:v>0</c:v>
+                </c:pt>
+                <c:pt idx="23">
+                  <c:v>0</c:v>
+                </c:pt>
+                <c:pt idx="24">
+                  <c:v>0</c:v>
+                </c:pt>
+                <c:pt idx="25">
+                  <c:v>0</c:v>
+                </c:pt>
+                <c:pt idx="26">
+                  <c:v>0</c:v>
+                </c:pt>
+                <c:pt idx="27">
+                  <c:v>0</c:v>
+                </c:pt>
+                <c:pt idx="28">
+                  <c:v>0</c:v>
+                </c:pt>
+                <c:pt idx="29">
+                  <c:v>0</c:v>
+                </c:pt>
+                <c:pt idx="30">
+                  <c:v>0</c:v>
+                </c:pt>
+                <c:pt idx="31">
+                  <c:v>0</c:v>
+                </c:pt>
+                <c:pt idx="32">
+                  <c:v>0</c:v>
+                </c:pt>
+                <c:pt idx="33">
+                  <c:v>0</c:v>
+                </c:pt>
+                <c:pt idx="34">
+                  <c:v>0</c:v>
+                </c:pt>
+                <c:pt idx="35">
+                  <c:v>0</c:v>
+                </c:pt>
+                <c:pt idx="36">
+                  <c:v>0</c:v>
                 </c:pt>
               </c:numCache>
             </c:numRef>
@@ -1279,7 +1065,7 @@
           <c:showPercent val="0"/>
           <c:showBubbleSize val="0"/>
         </c:dLbls>
-        <c:gapWidth val="74"/>
+        <c:gapWidth val="70"/>
         <c:overlap val="100"/>
         <c:axId val="790563136"/>
         <c:axId val="768197296"/>
@@ -1311,7 +1097,7 @@
           <a:lstStyle/>
           <a:p>
             <a:pPr>
-              <a:defRPr baseline="0">
+              <a:defRPr sz="800" baseline="0">
                 <a:solidFill>
                   <a:schemeClr val="bg1"/>
                 </a:solidFill>
@@ -1476,7 +1262,7 @@
           <a:p>
             <a:fld id="{8F7EB338-8BB0-B64B-9F79-C87EA24D723F}" type="datetimeFigureOut">
               <a:rPr lang="en-US" smtClean="0"/>
-              <a:t>7/25/20</a:t>
+              <a:t>10/11/20</a:t>
             </a:fld>
             <a:endParaRPr lang="en-US"/>
           </a:p>
@@ -2209,7 +1995,7 @@
           <a:p>
             <a:r>
               <a:rPr lang="en-US" dirty="0"/>
-              <a:t>http://</a:t>
+              <a:t>See http://</a:t>
             </a:r>
             <a:r>
               <a:rPr lang="en-US" dirty="0" err="1"/>
@@ -2223,7 +2009,26 @@
               <a:rPr lang="en-US" dirty="0" err="1"/>
               <a:t>Clement.shtml</a:t>
             </a:r>
-            <a:endParaRPr lang="en-US" dirty="0"/>
+            <a:r>
+              <a:rPr lang="en-US" dirty="0"/>
+              <a:t> and https://</a:t>
+            </a:r>
+            <a:r>
+              <a:rPr lang="en-US" dirty="0" err="1"/>
+              <a:t>www.thegospelcoalition.org</a:t>
+            </a:r>
+            <a:r>
+              <a:rPr lang="en-US" dirty="0"/>
+              <a:t>/article/apocrypha-and-canon-in-early-</a:t>
+            </a:r>
+            <a:r>
+              <a:rPr lang="en-US" dirty="0" err="1"/>
+              <a:t>christianity</a:t>
+            </a:r>
+            <a:r>
+              <a:rPr lang="en-US" dirty="0"/>
+              <a:t>/</a:t>
+            </a:r>
           </a:p>
         </p:txBody>
       </p:sp>
@@ -2244,7 +2049,7 @@
           <a:p>
             <a:fld id="{E31E1A05-B3B6-6F43-8051-B5A825C5C2A3}" type="slidenum">
               <a:rPr lang="en-US" smtClean="0"/>
-              <a:t>14</a:t>
+              <a:t>11</a:t>
             </a:fld>
             <a:endParaRPr lang="en-US"/>
           </a:p>
@@ -2253,7 +2058,7 @@
     </p:spTree>
     <p:extLst>
       <p:ext uri="{BB962C8B-B14F-4D97-AF65-F5344CB8AC3E}">
-        <p14:creationId xmlns:p14="http://schemas.microsoft.com/office/powerpoint/2010/main" val="3313317989"/>
+        <p14:creationId xmlns:p14="http://schemas.microsoft.com/office/powerpoint/2010/main" val="1636279365"/>
       </p:ext>
     </p:extLst>
   </p:cSld>
@@ -2531,7 +2336,7 @@
             <a:fld id="{DBE77699-C466-4996-ADED-71C8160E04A2}" type="datetimeFigureOut">
               <a:rPr lang="en-US" smtClean="0"/>
               <a:pPr/>
-              <a:t>7/25/20</a:t>
+              <a:t>10/11/20</a:t>
             </a:fld>
             <a:endParaRPr lang="en-US"/>
           </a:p>
@@ -2696,7 +2501,7 @@
             <a:fld id="{DBE77699-C466-4996-ADED-71C8160E04A2}" type="datetimeFigureOut">
               <a:rPr lang="en-US" smtClean="0"/>
               <a:pPr/>
-              <a:t>7/25/20</a:t>
+              <a:t>10/11/20</a:t>
             </a:fld>
             <a:endParaRPr lang="en-US"/>
           </a:p>
@@ -2871,7 +2676,7 @@
             <a:fld id="{DBE77699-C466-4996-ADED-71C8160E04A2}" type="datetimeFigureOut">
               <a:rPr lang="en-US" smtClean="0"/>
               <a:pPr/>
-              <a:t>7/25/20</a:t>
+              <a:t>10/11/20</a:t>
             </a:fld>
             <a:endParaRPr lang="en-US"/>
           </a:p>
@@ -2990,7 +2795,7 @@
             <a:fld id="{DBE77699-C466-4996-ADED-71C8160E04A2}" type="datetimeFigureOut">
               <a:rPr lang="en-US" smtClean="0"/>
               <a:pPr/>
-              <a:t>7/25/20</a:t>
+              <a:t>10/11/20</a:t>
             </a:fld>
             <a:endParaRPr lang="en-US"/>
           </a:p>
@@ -3398,7 +3203,7 @@
             <a:fld id="{DBE77699-C466-4996-ADED-71C8160E04A2}" type="datetimeFigureOut">
               <a:rPr lang="en-US" smtClean="0"/>
               <a:pPr/>
-              <a:t>7/25/20</a:t>
+              <a:t>10/11/20</a:t>
             </a:fld>
             <a:endParaRPr lang="en-US"/>
           </a:p>
@@ -3640,7 +3445,7 @@
             <a:fld id="{DBE77699-C466-4996-ADED-71C8160E04A2}" type="datetimeFigureOut">
               <a:rPr lang="en-US" smtClean="0"/>
               <a:pPr/>
-              <a:t>7/25/20</a:t>
+              <a:t>10/11/20</a:t>
             </a:fld>
             <a:endParaRPr lang="en-US"/>
           </a:p>
@@ -3922,7 +3727,7 @@
             <a:fld id="{DBE77699-C466-4996-ADED-71C8160E04A2}" type="datetimeFigureOut">
               <a:rPr lang="en-US" smtClean="0"/>
               <a:pPr/>
-              <a:t>7/25/20</a:t>
+              <a:t>10/11/20</a:t>
             </a:fld>
             <a:endParaRPr lang="en-US"/>
           </a:p>
@@ -4338,7 +4143,7 @@
             <a:fld id="{DBE77699-C466-4996-ADED-71C8160E04A2}" type="datetimeFigureOut">
               <a:rPr lang="en-US" smtClean="0"/>
               <a:pPr/>
-              <a:t>7/25/20</a:t>
+              <a:t>10/11/20</a:t>
             </a:fld>
             <a:endParaRPr lang="en-US"/>
           </a:p>
@@ -4452,7 +4257,7 @@
             <a:fld id="{DBE77699-C466-4996-ADED-71C8160E04A2}" type="datetimeFigureOut">
               <a:rPr lang="en-US" smtClean="0"/>
               <a:pPr/>
-              <a:t>7/25/20</a:t>
+              <a:t>10/11/20</a:t>
             </a:fld>
             <a:endParaRPr lang="en-US"/>
           </a:p>
@@ -4544,7 +4349,7 @@
             <a:fld id="{DBE77699-C466-4996-ADED-71C8160E04A2}" type="datetimeFigureOut">
               <a:rPr lang="en-US" smtClean="0"/>
               <a:pPr/>
-              <a:t>7/25/20</a:t>
+              <a:t>10/11/20</a:t>
             </a:fld>
             <a:endParaRPr lang="en-US"/>
           </a:p>
@@ -4816,7 +4621,7 @@
             <a:fld id="{DBE77699-C466-4996-ADED-71C8160E04A2}" type="datetimeFigureOut">
               <a:rPr lang="en-US" smtClean="0"/>
               <a:pPr/>
-              <a:t>7/25/20</a:t>
+              <a:t>10/11/20</a:t>
             </a:fld>
             <a:endParaRPr lang="en-US"/>
           </a:p>
@@ -5065,7 +4870,7 @@
             <a:fld id="{DBE77699-C466-4996-ADED-71C8160E04A2}" type="datetimeFigureOut">
               <a:rPr lang="en-US" smtClean="0"/>
               <a:pPr/>
-              <a:t>7/25/20</a:t>
+              <a:t>10/11/20</a:t>
             </a:fld>
             <a:endParaRPr lang="en-US"/>
           </a:p>
@@ -5276,7 +5081,7 @@
             <a:fld id="{DBE77699-C466-4996-ADED-71C8160E04A2}" type="datetimeFigureOut">
               <a:rPr lang="en-US" smtClean="0"/>
               <a:pPr/>
-              <a:t>7/25/20</a:t>
+              <a:t>10/11/20</a:t>
             </a:fld>
             <a:endParaRPr lang="en-US"/>
           </a:p>
@@ -7328,6 +7133,127 @@
           <a:chExt cx="0" cy="0"/>
         </a:xfrm>
       </p:grpSpPr>
+      <p:graphicFrame>
+        <p:nvGraphicFramePr>
+          <p:cNvPr id="4" name="Content Placeholder 3"/>
+          <p:cNvGraphicFramePr>
+            <a:graphicFrameLocks noGrp="1"/>
+          </p:cNvGraphicFramePr>
+          <p:nvPr>
+            <p:ph idx="1"/>
+            <p:extLst>
+              <p:ext uri="{D42A27DB-BD31-4B8C-83A1-F6EECF244321}">
+                <p14:modId xmlns:p14="http://schemas.microsoft.com/office/powerpoint/2010/main" val="1878792987"/>
+              </p:ext>
+            </p:extLst>
+          </p:nvPr>
+        </p:nvGraphicFramePr>
+        <p:xfrm>
+          <a:off x="457200" y="1447800"/>
+          <a:ext cx="8229600" cy="5105400"/>
+        </p:xfrm>
+        <a:graphic>
+          <a:graphicData uri="http://schemas.openxmlformats.org/drawingml/2006/chart">
+            <c:chart xmlns:c="http://schemas.openxmlformats.org/drawingml/2006/chart" xmlns:r="http://schemas.openxmlformats.org/officeDocument/2006/relationships" r:id="rId3"/>
+          </a:graphicData>
+        </a:graphic>
+      </p:graphicFrame>
+      <p:sp>
+        <p:nvSpPr>
+          <p:cNvPr id="6" name="TextBox 5"/>
+          <p:cNvSpPr txBox="1"/>
+          <p:nvPr/>
+        </p:nvSpPr>
+        <p:spPr>
+          <a:xfrm>
+            <a:off x="228600" y="152400"/>
+            <a:ext cx="8610600" cy="769441"/>
+          </a:xfrm>
+          <a:prstGeom prst="rect">
+            <a:avLst/>
+          </a:prstGeom>
+          <a:noFill/>
+        </p:spPr>
+        <p:txBody>
+          <a:bodyPr wrap="square" rtlCol="0">
+            <a:spAutoFit/>
+          </a:bodyPr>
+          <a:lstStyle/>
+          <a:p>
+            <a:r>
+              <a:rPr lang="en-US" sz="4400" dirty="0"/>
+              <a:t>Clement of Alexandria Citations</a:t>
+            </a:r>
+            <a:endParaRPr lang="en-US" sz="4400" b="1" dirty="0"/>
+          </a:p>
+        </p:txBody>
+      </p:sp>
+      <p:sp>
+        <p:nvSpPr>
+          <p:cNvPr id="7" name="TextBox 6"/>
+          <p:cNvSpPr txBox="1"/>
+          <p:nvPr/>
+        </p:nvSpPr>
+        <p:spPr>
+          <a:xfrm>
+            <a:off x="228600" y="762000"/>
+            <a:ext cx="8610600" cy="461665"/>
+          </a:xfrm>
+          <a:prstGeom prst="rect">
+            <a:avLst/>
+          </a:prstGeom>
+          <a:noFill/>
+        </p:spPr>
+        <p:txBody>
+          <a:bodyPr wrap="square" rtlCol="0">
+            <a:spAutoFit/>
+          </a:bodyPr>
+          <a:lstStyle/>
+          <a:p>
+            <a:r>
+              <a:rPr lang="en-US" sz="2400" b="1" dirty="0">
+                <a:solidFill>
+                  <a:schemeClr val="bg1">
+                    <a:lumMod val="50000"/>
+                    <a:lumOff val="50000"/>
+                  </a:schemeClr>
+                </a:solidFill>
+              </a:rPr>
+              <a:t>Frequency of citations of canonical and non-canonical Gospels</a:t>
+            </a:r>
+          </a:p>
+        </p:txBody>
+      </p:sp>
+    </p:spTree>
+    <p:extLst>
+      <p:ext uri="{BB962C8B-B14F-4D97-AF65-F5344CB8AC3E}">
+        <p14:creationId xmlns:p14="http://schemas.microsoft.com/office/powerpoint/2010/main" val="2044642401"/>
+      </p:ext>
+    </p:extLst>
+  </p:cSld>
+  <p:clrMapOvr>
+    <a:masterClrMapping/>
+  </p:clrMapOvr>
+</p:sld>
+</file>
+
+<file path=ppt/slides/slide12.xml><?xml version="1.0" encoding="utf-8"?>
+<p:sld xmlns:a="http://schemas.openxmlformats.org/drawingml/2006/main" xmlns:r="http://schemas.openxmlformats.org/officeDocument/2006/relationships" xmlns:p="http://schemas.openxmlformats.org/presentationml/2006/main">
+  <p:cSld>
+    <p:spTree>
+      <p:nvGrpSpPr>
+        <p:cNvPr id="1" name=""/>
+        <p:cNvGrpSpPr/>
+        <p:nvPr/>
+      </p:nvGrpSpPr>
+      <p:grpSpPr>
+        <a:xfrm>
+          <a:off x="0" y="0"/>
+          <a:ext cx="0" cy="0"/>
+          <a:chOff x="0" y="0"/>
+          <a:chExt cx="0" cy="0"/>
+        </a:xfrm>
+      </p:grpSpPr>
       <p:sp>
         <p:nvSpPr>
           <p:cNvPr id="2" name="Title 1">
@@ -7860,7 +7786,7 @@
 </p:sld>
 </file>
 
-<file path=ppt/slides/slide12.xml><?xml version="1.0" encoding="utf-8"?>
+<file path=ppt/slides/slide13.xml><?xml version="1.0" encoding="utf-8"?>
 <p:sld xmlns:a="http://schemas.openxmlformats.org/drawingml/2006/main" xmlns:r="http://schemas.openxmlformats.org/officeDocument/2006/relationships" xmlns:p="http://schemas.openxmlformats.org/presentationml/2006/main">
   <p:cSld>
     <p:spTree>
@@ -7917,7 +7843,7 @@
             <a:r>
               <a:rPr lang="en-US" sz="4000" dirty="0">
                 <a:highlight>
-                  <a:srgbClr val="009EC0"/>
+                  <a:srgbClr val="C00002"/>
                 </a:highlight>
               </a:rPr>
               <a:t> </a:t>
@@ -7925,7 +7851,7 @@
             <a:r>
               <a:rPr lang="en-US" sz="4000" b="1" dirty="0">
                 <a:highlight>
-                  <a:srgbClr val="009EC0"/>
+                  <a:srgbClr val="C00002"/>
                 </a:highlight>
               </a:rPr>
               <a:t>It is not possible that the gospels can be either more or fewer </a:t>
@@ -8177,126 +8103,6 @@
 </p:sld>
 </file>
 
-<file path=ppt/slides/slide13.xml><?xml version="1.0" encoding="utf-8"?>
-<p:sld xmlns:a="http://schemas.openxmlformats.org/drawingml/2006/main" xmlns:r="http://schemas.openxmlformats.org/officeDocument/2006/relationships" xmlns:p="http://schemas.openxmlformats.org/presentationml/2006/main">
-  <p:cSld>
-    <p:spTree>
-      <p:nvGrpSpPr>
-        <p:cNvPr id="1" name=""/>
-        <p:cNvGrpSpPr/>
-        <p:nvPr/>
-      </p:nvGrpSpPr>
-      <p:grpSpPr>
-        <a:xfrm>
-          <a:off x="0" y="0"/>
-          <a:ext cx="0" cy="0"/>
-          <a:chOff x="0" y="0"/>
-          <a:chExt cx="0" cy="0"/>
-        </a:xfrm>
-      </p:grpSpPr>
-      <p:graphicFrame>
-        <p:nvGraphicFramePr>
-          <p:cNvPr id="4" name="Content Placeholder 3"/>
-          <p:cNvGraphicFramePr>
-            <a:graphicFrameLocks noGrp="1"/>
-          </p:cNvGraphicFramePr>
-          <p:nvPr>
-            <p:ph idx="1"/>
-            <p:extLst>
-              <p:ext uri="{D42A27DB-BD31-4B8C-83A1-F6EECF244321}">
-                <p14:modId xmlns:p14="http://schemas.microsoft.com/office/powerpoint/2010/main" val="521027871"/>
-              </p:ext>
-            </p:extLst>
-          </p:nvPr>
-        </p:nvGraphicFramePr>
-        <p:xfrm>
-          <a:off x="76200" y="1223665"/>
-          <a:ext cx="8991600" cy="5481935"/>
-        </p:xfrm>
-        <a:graphic>
-          <a:graphicData uri="http://schemas.openxmlformats.org/drawingml/2006/chart">
-            <c:chart xmlns:c="http://schemas.openxmlformats.org/drawingml/2006/chart" xmlns:r="http://schemas.openxmlformats.org/officeDocument/2006/relationships" r:id="rId2"/>
-          </a:graphicData>
-        </a:graphic>
-      </p:graphicFrame>
-      <p:sp>
-        <p:nvSpPr>
-          <p:cNvPr id="6" name="TextBox 5"/>
-          <p:cNvSpPr txBox="1"/>
-          <p:nvPr/>
-        </p:nvSpPr>
-        <p:spPr>
-          <a:xfrm>
-            <a:off x="228600" y="152400"/>
-            <a:ext cx="8610600" cy="769441"/>
-          </a:xfrm>
-          <a:prstGeom prst="rect">
-            <a:avLst/>
-          </a:prstGeom>
-          <a:noFill/>
-        </p:spPr>
-        <p:txBody>
-          <a:bodyPr wrap="square" rtlCol="0">
-            <a:spAutoFit/>
-          </a:bodyPr>
-          <a:lstStyle/>
-          <a:p>
-            <a:r>
-              <a:rPr lang="en-US" sz="4400" b="1" dirty="0"/>
-              <a:t>Most Common Books</a:t>
-            </a:r>
-          </a:p>
-        </p:txBody>
-      </p:sp>
-      <p:sp>
-        <p:nvSpPr>
-          <p:cNvPr id="7" name="TextBox 6"/>
-          <p:cNvSpPr txBox="1"/>
-          <p:nvPr/>
-        </p:nvSpPr>
-        <p:spPr>
-          <a:xfrm>
-            <a:off x="228600" y="762000"/>
-            <a:ext cx="8610600" cy="461665"/>
-          </a:xfrm>
-          <a:prstGeom prst="rect">
-            <a:avLst/>
-          </a:prstGeom>
-          <a:noFill/>
-        </p:spPr>
-        <p:txBody>
-          <a:bodyPr wrap="square" rtlCol="0">
-            <a:spAutoFit/>
-          </a:bodyPr>
-          <a:lstStyle/>
-          <a:p>
-            <a:r>
-              <a:rPr lang="en-US" sz="2400" b="1" dirty="0">
-                <a:solidFill>
-                  <a:schemeClr val="bg1">
-                    <a:lumMod val="50000"/>
-                    <a:lumOff val="50000"/>
-                  </a:schemeClr>
-                </a:solidFill>
-              </a:rPr>
-              <a:t>In early canons and collections</a:t>
-            </a:r>
-          </a:p>
-        </p:txBody>
-      </p:sp>
-    </p:spTree>
-    <p:extLst>
-      <p:ext uri="{BB962C8B-B14F-4D97-AF65-F5344CB8AC3E}">
-        <p14:creationId xmlns:p14="http://schemas.microsoft.com/office/powerpoint/2010/main" val="1851670022"/>
-      </p:ext>
-    </p:extLst>
-  </p:cSld>
-  <p:clrMapOvr>
-    <a:masterClrMapping/>
-  </p:clrMapOvr>
-</p:sld>
-</file>
-
 <file path=ppt/slides/slide14.xml><?xml version="1.0" encoding="utf-8"?>
 <p:sld xmlns:a="http://schemas.openxmlformats.org/drawingml/2006/main" xmlns:r="http://schemas.openxmlformats.org/officeDocument/2006/relationships" xmlns:p="http://schemas.openxmlformats.org/presentationml/2006/main">
   <p:cSld>
@@ -8324,31 +8130,37 @@
             <p:ph idx="1"/>
             <p:extLst>
               <p:ext uri="{D42A27DB-BD31-4B8C-83A1-F6EECF244321}">
-                <p14:modId xmlns:p14="http://schemas.microsoft.com/office/powerpoint/2010/main" val="3062150118"/>
+                <p14:modId xmlns:p14="http://schemas.microsoft.com/office/powerpoint/2010/main" val="3104542462"/>
               </p:ext>
             </p:extLst>
           </p:nvPr>
         </p:nvGraphicFramePr>
         <p:xfrm>
-          <a:off x="457200" y="1447800"/>
-          <a:ext cx="8229600" cy="5105400"/>
+          <a:off x="76200" y="0"/>
+          <a:ext cx="8991600" cy="6857999"/>
         </p:xfrm>
         <a:graphic>
           <a:graphicData uri="http://schemas.openxmlformats.org/drawingml/2006/chart">
-            <c:chart xmlns:c="http://schemas.openxmlformats.org/drawingml/2006/chart" xmlns:r="http://schemas.openxmlformats.org/officeDocument/2006/relationships" r:id="rId3"/>
+            <c:chart xmlns:c="http://schemas.openxmlformats.org/drawingml/2006/chart" xmlns:r="http://schemas.openxmlformats.org/officeDocument/2006/relationships" r:id="rId2"/>
           </a:graphicData>
         </a:graphic>
       </p:graphicFrame>
       <p:sp>
         <p:nvSpPr>
-          <p:cNvPr id="6" name="TextBox 5"/>
+          <p:cNvPr id="2" name="TextBox 1">
+            <a:extLst>
+              <a:ext uri="{FF2B5EF4-FFF2-40B4-BE49-F238E27FC236}">
+                <a16:creationId xmlns:a16="http://schemas.microsoft.com/office/drawing/2014/main" id="{8D64888C-72C1-CB41-8A40-45F1AB2B584E}"/>
+              </a:ext>
+            </a:extLst>
+          </p:cNvPr>
           <p:cNvSpPr txBox="1"/>
           <p:nvPr/>
         </p:nvSpPr>
         <p:spPr>
           <a:xfrm>
-            <a:off x="228600" y="152400"/>
-            <a:ext cx="8610600" cy="769441"/>
+            <a:off x="4876800" y="5257800"/>
+            <a:ext cx="4001095" cy="830997"/>
           </a:xfrm>
           <a:prstGeom prst="rect">
             <a:avLst/>
@@ -8356,50 +8168,20 @@
           <a:noFill/>
         </p:spPr>
         <p:txBody>
-          <a:bodyPr wrap="square" rtlCol="0">
+          <a:bodyPr wrap="none" rtlCol="0">
             <a:spAutoFit/>
           </a:bodyPr>
           <a:lstStyle/>
           <a:p>
             <a:r>
-              <a:rPr lang="en-US" sz="4400" b="1" dirty="0"/>
-              <a:t>Clement of Alexandria</a:t>
+              <a:rPr lang="en-US" sz="2400" b="1" dirty="0"/>
+              <a:t>Most Common Books</a:t>
             </a:r>
           </a:p>
-        </p:txBody>
-      </p:sp>
-      <p:sp>
-        <p:nvSpPr>
-          <p:cNvPr id="7" name="TextBox 6"/>
-          <p:cNvSpPr txBox="1"/>
-          <p:nvPr/>
-        </p:nvSpPr>
-        <p:spPr>
-          <a:xfrm>
-            <a:off x="228600" y="762000"/>
-            <a:ext cx="8610600" cy="461665"/>
-          </a:xfrm>
-          <a:prstGeom prst="rect">
-            <a:avLst/>
-          </a:prstGeom>
-          <a:noFill/>
-        </p:spPr>
-        <p:txBody>
-          <a:bodyPr wrap="square" rtlCol="0">
-            <a:spAutoFit/>
-          </a:bodyPr>
-          <a:lstStyle/>
           <a:p>
             <a:r>
-              <a:rPr lang="en-US" sz="2400" b="1" dirty="0">
-                <a:solidFill>
-                  <a:schemeClr val="bg1">
-                    <a:lumMod val="50000"/>
-                    <a:lumOff val="50000"/>
-                  </a:schemeClr>
-                </a:solidFill>
-              </a:rPr>
-              <a:t>Works quoted</a:t>
+              <a:rPr lang="en-US" sz="2400" dirty="0"/>
+              <a:t>In early canons and collections</a:t>
             </a:r>
           </a:p>
         </p:txBody>
@@ -8407,7 +8189,7 @@
     </p:spTree>
     <p:extLst>
       <p:ext uri="{BB962C8B-B14F-4D97-AF65-F5344CB8AC3E}">
-        <p14:creationId xmlns:p14="http://schemas.microsoft.com/office/powerpoint/2010/main" val="1730624872"/>
+        <p14:creationId xmlns:p14="http://schemas.microsoft.com/office/powerpoint/2010/main" val="1851670022"/>
       </p:ext>
     </p:extLst>
   </p:cSld>
@@ -8679,7 +8461,7 @@
           <p:nvPr>
             <p:extLst>
               <p:ext uri="{D42A27DB-BD31-4B8C-83A1-F6EECF244321}">
-                <p14:modId xmlns:p14="http://schemas.microsoft.com/office/powerpoint/2010/main" val="2185590660"/>
+                <p14:modId xmlns:p14="http://schemas.microsoft.com/office/powerpoint/2010/main" val="4212050651"/>
               </p:ext>
             </p:extLst>
           </p:nvPr>
@@ -8728,7 +8510,7 @@
                       </a:pPr>
                       <a:r>
                         <a:rPr lang="en-US" sz="2400" b="0" dirty="0"/>
-                        <a:t>See previous lessons: undesigned coincidences (lessons 12 &amp; 13), fulfilled prophecy (lesson 17), wisdom (lesson 16)</a:t>
+                        <a:t>See other lessons: undesigned coincidences (lessons 12 &amp; 13), fulfilled prophecy (lesson 17), wisdom (lesson 16)</a:t>
                       </a:r>
                     </a:p>
                   </a:txBody>

</xml_diff>